<commit_message>
Update Storage and Ui Class Diagrams
</commit_message>
<xml_diff>
--- a/docs/diagrams/StorageComponentClassDiagram.pptx
+++ b/docs/diagrams/StorageComponentClassDiagram.pptx
@@ -107,6 +107,22 @@
       </a:defRPr>
     </a:lvl9pPr>
   </p:defaultTextStyle>
+  <p:extLst>
+    <p:ext uri="{EFAFB233-063F-42B5-8137-9DF3F51BA10A}">
+      <p15:sldGuideLst xmlns:p15="http://schemas.microsoft.com/office/powerpoint/2012/main">
+        <p15:guide id="1" orient="horz" pos="1488">
+          <p15:clr>
+            <a:srgbClr val="A4A3A4"/>
+          </p15:clr>
+        </p15:guide>
+        <p15:guide id="2" pos="2880">
+          <p15:clr>
+            <a:srgbClr val="A4A3A4"/>
+          </p15:clr>
+        </p15:guide>
+      </p15:sldGuideLst>
+    </p:ext>
+  </p:extLst>
 </p:presentation>
 </file>
 
@@ -192,7 +208,7 @@
           <a:p>
             <a:fld id="{F5CC4B3F-88C1-4FFA-B1B6-F41C21DC6924}" type="datetimeFigureOut">
               <a:rPr lang="en-US" smtClean="0"/>
-              <a:t>10/16/2016</a:t>
+              <a:t>11/7/17</a:t>
             </a:fld>
             <a:endParaRPr lang="en-US"/>
           </a:p>
@@ -641,7 +657,7 @@
           <a:p>
             <a:fld id="{78C97017-6FC3-485B-9764-EAC9E56C1D49}" type="datetimeFigureOut">
               <a:rPr lang="en-US" smtClean="0"/>
-              <a:t>10/16/2016</a:t>
+              <a:t>11/7/17</a:t>
             </a:fld>
             <a:endParaRPr lang="en-US"/>
           </a:p>
@@ -811,7 +827,7 @@
           <a:p>
             <a:fld id="{78C97017-6FC3-485B-9764-EAC9E56C1D49}" type="datetimeFigureOut">
               <a:rPr lang="en-US" smtClean="0"/>
-              <a:t>10/16/2016</a:t>
+              <a:t>11/7/17</a:t>
             </a:fld>
             <a:endParaRPr lang="en-US"/>
           </a:p>
@@ -991,7 +1007,7 @@
           <a:p>
             <a:fld id="{78C97017-6FC3-485B-9764-EAC9E56C1D49}" type="datetimeFigureOut">
               <a:rPr lang="en-US" smtClean="0"/>
-              <a:t>10/16/2016</a:t>
+              <a:t>11/7/17</a:t>
             </a:fld>
             <a:endParaRPr lang="en-US"/>
           </a:p>
@@ -1161,7 +1177,7 @@
           <a:p>
             <a:fld id="{78C97017-6FC3-485B-9764-EAC9E56C1D49}" type="datetimeFigureOut">
               <a:rPr lang="en-US" smtClean="0"/>
-              <a:t>10/16/2016</a:t>
+              <a:t>11/7/17</a:t>
             </a:fld>
             <a:endParaRPr lang="en-US"/>
           </a:p>
@@ -1407,7 +1423,7 @@
           <a:p>
             <a:fld id="{78C97017-6FC3-485B-9764-EAC9E56C1D49}" type="datetimeFigureOut">
               <a:rPr lang="en-US" smtClean="0"/>
-              <a:t>10/16/2016</a:t>
+              <a:t>11/7/17</a:t>
             </a:fld>
             <a:endParaRPr lang="en-US"/>
           </a:p>
@@ -1695,7 +1711,7 @@
           <a:p>
             <a:fld id="{78C97017-6FC3-485B-9764-EAC9E56C1D49}" type="datetimeFigureOut">
               <a:rPr lang="en-US" smtClean="0"/>
-              <a:t>10/16/2016</a:t>
+              <a:t>11/7/17</a:t>
             </a:fld>
             <a:endParaRPr lang="en-US"/>
           </a:p>
@@ -2117,7 +2133,7 @@
           <a:p>
             <a:fld id="{78C97017-6FC3-485B-9764-EAC9E56C1D49}" type="datetimeFigureOut">
               <a:rPr lang="en-US" smtClean="0"/>
-              <a:t>10/16/2016</a:t>
+              <a:t>11/7/17</a:t>
             </a:fld>
             <a:endParaRPr lang="en-US"/>
           </a:p>
@@ -2235,7 +2251,7 @@
           <a:p>
             <a:fld id="{78C97017-6FC3-485B-9764-EAC9E56C1D49}" type="datetimeFigureOut">
               <a:rPr lang="en-US" smtClean="0"/>
-              <a:t>10/16/2016</a:t>
+              <a:t>11/7/17</a:t>
             </a:fld>
             <a:endParaRPr lang="en-US"/>
           </a:p>
@@ -2330,7 +2346,7 @@
           <a:p>
             <a:fld id="{78C97017-6FC3-485B-9764-EAC9E56C1D49}" type="datetimeFigureOut">
               <a:rPr lang="en-US" smtClean="0"/>
-              <a:t>10/16/2016</a:t>
+              <a:t>11/7/17</a:t>
             </a:fld>
             <a:endParaRPr lang="en-US"/>
           </a:p>
@@ -2607,7 +2623,7 @@
           <a:p>
             <a:fld id="{78C97017-6FC3-485B-9764-EAC9E56C1D49}" type="datetimeFigureOut">
               <a:rPr lang="en-US" smtClean="0"/>
-              <a:t>10/16/2016</a:t>
+              <a:t>11/7/17</a:t>
             </a:fld>
             <a:endParaRPr lang="en-US"/>
           </a:p>
@@ -2860,7 +2876,7 @@
           <a:p>
             <a:fld id="{78C97017-6FC3-485B-9764-EAC9E56C1D49}" type="datetimeFigureOut">
               <a:rPr lang="en-US" smtClean="0"/>
-              <a:t>10/16/2016</a:t>
+              <a:t>11/7/17</a:t>
             </a:fld>
             <a:endParaRPr lang="en-US"/>
           </a:p>
@@ -3073,7 +3089,7 @@
           <a:p>
             <a:fld id="{78C97017-6FC3-485B-9764-EAC9E56C1D49}" type="datetimeFigureOut">
               <a:rPr lang="en-US" smtClean="0"/>
-              <a:t>10/16/2016</a:t>
+              <a:t>11/7/17</a:t>
             </a:fld>
             <a:endParaRPr lang="en-US"/>
           </a:p>
@@ -3456,8 +3472,8 @@
         </p:nvSpPr>
         <p:spPr>
           <a:xfrm>
-            <a:off x="1119865" y="2086382"/>
-            <a:ext cx="7871735" cy="1723618"/>
+            <a:off x="-152400" y="1153464"/>
+            <a:ext cx="9567409" cy="2286000"/>
           </a:xfrm>
           <a:prstGeom prst="roundRect">
             <a:avLst>
@@ -3521,7 +3537,7 @@
         </p:nvSpPr>
         <p:spPr>
           <a:xfrm>
-            <a:off x="2877180" y="3158440"/>
+            <a:off x="1967089" y="2215058"/>
             <a:ext cx="1323049" cy="346760"/>
           </a:xfrm>
           <a:prstGeom prst="rect">
@@ -3599,7 +3615,7 @@
         </p:nvSpPr>
         <p:spPr>
           <a:xfrm rot="16200000">
-            <a:off x="1683963" y="2868687"/>
+            <a:off x="773872" y="1925305"/>
             <a:ext cx="1093635" cy="346760"/>
           </a:xfrm>
           <a:prstGeom prst="rect">
@@ -3662,7 +3678,7 @@
         </p:nvSpPr>
         <p:spPr>
           <a:xfrm rot="16200000">
-            <a:off x="956202" y="2861202"/>
+            <a:off x="46111" y="1917820"/>
             <a:ext cx="1093635" cy="346760"/>
           </a:xfrm>
           <a:prstGeom prst="rect">
@@ -3736,7 +3752,7 @@
         </p:nvSpPr>
         <p:spPr>
           <a:xfrm rot="16200000">
-            <a:off x="1626910" y="2952291"/>
+            <a:off x="716819" y="2008909"/>
             <a:ext cx="270504" cy="175523"/>
           </a:xfrm>
           <a:prstGeom prst="triangle">
@@ -3794,7 +3810,7 @@
         </p:nvCxnSpPr>
         <p:spPr>
           <a:xfrm>
-            <a:off x="2656370" y="3326536"/>
+            <a:off x="1746279" y="2383154"/>
             <a:ext cx="220810" cy="5284"/>
           </a:xfrm>
           <a:prstGeom prst="straightConnector1">
@@ -3834,7 +3850,7 @@
         </p:nvCxnSpPr>
         <p:spPr>
           <a:xfrm>
-            <a:off x="910091" y="3040053"/>
+            <a:off x="0" y="2096671"/>
             <a:ext cx="419548" cy="2860"/>
           </a:xfrm>
           <a:prstGeom prst="bentConnector3">
@@ -3879,7 +3895,7 @@
         </p:nvCxnSpPr>
         <p:spPr>
           <a:xfrm flipV="1">
-            <a:off x="1849924" y="3040052"/>
+            <a:off x="939833" y="2096670"/>
             <a:ext cx="216105" cy="1"/>
           </a:xfrm>
           <a:prstGeom prst="line">
@@ -3920,7 +3936,7 @@
         </p:nvSpPr>
         <p:spPr>
           <a:xfrm>
-            <a:off x="2420322" y="3239846"/>
+            <a:off x="1510231" y="2296464"/>
             <a:ext cx="236048" cy="173380"/>
           </a:xfrm>
           <a:prstGeom prst="flowChartDecision">
@@ -3974,7 +3990,7 @@
         </p:nvCxnSpPr>
         <p:spPr>
           <a:xfrm flipV="1">
-            <a:off x="4398041" y="3331820"/>
+            <a:off x="3487950" y="2388438"/>
             <a:ext cx="223324" cy="1"/>
           </a:xfrm>
           <a:prstGeom prst="bentConnector3">
@@ -4017,7 +4033,7 @@
         </p:nvSpPr>
         <p:spPr>
           <a:xfrm rot="5400000" flipV="1">
-            <a:off x="4175027" y="3244059"/>
+            <a:off x="3264936" y="2300677"/>
             <a:ext cx="270504" cy="175523"/>
           </a:xfrm>
           <a:prstGeom prst="triangle">
@@ -4075,7 +4091,7 @@
         </p:nvCxnSpPr>
         <p:spPr>
           <a:xfrm>
-            <a:off x="5791200" y="3331820"/>
+            <a:off x="4881109" y="2388438"/>
             <a:ext cx="228600" cy="1970"/>
           </a:xfrm>
           <a:prstGeom prst="bentConnector3">
@@ -4118,7 +4134,7 @@
         </p:nvSpPr>
         <p:spPr>
           <a:xfrm>
-            <a:off x="4621365" y="3158440"/>
+            <a:off x="3711274" y="2215058"/>
             <a:ext cx="1169835" cy="346760"/>
           </a:xfrm>
           <a:prstGeom prst="rect">
@@ -4203,7 +4219,7 @@
         </p:nvSpPr>
         <p:spPr>
           <a:xfrm>
-            <a:off x="2873943" y="2558040"/>
+            <a:off x="1963852" y="1614658"/>
             <a:ext cx="1323049" cy="346760"/>
           </a:xfrm>
           <a:prstGeom prst="rect">
@@ -4284,7 +4300,7 @@
         </p:nvCxnSpPr>
         <p:spPr>
           <a:xfrm>
-            <a:off x="2653133" y="2726136"/>
+            <a:off x="1743042" y="1782754"/>
             <a:ext cx="220810" cy="5284"/>
           </a:xfrm>
           <a:prstGeom prst="straightConnector1">
@@ -4324,7 +4340,7 @@
         </p:nvSpPr>
         <p:spPr>
           <a:xfrm>
-            <a:off x="2417085" y="2639446"/>
+            <a:off x="1506994" y="1696064"/>
             <a:ext cx="236048" cy="173380"/>
           </a:xfrm>
           <a:prstGeom prst="flowChartDecision">
@@ -4378,7 +4394,7 @@
         </p:nvCxnSpPr>
         <p:spPr>
           <a:xfrm flipV="1">
-            <a:off x="4394804" y="2731420"/>
+            <a:off x="3484713" y="1788038"/>
             <a:ext cx="223324" cy="1"/>
           </a:xfrm>
           <a:prstGeom prst="bentConnector3">
@@ -4421,7 +4437,7 @@
         </p:nvSpPr>
         <p:spPr>
           <a:xfrm rot="5400000" flipV="1">
-            <a:off x="4171790" y="2643659"/>
+            <a:off x="3261699" y="1700277"/>
             <a:ext cx="270504" cy="175523"/>
           </a:xfrm>
           <a:prstGeom prst="triangle">
@@ -4476,7 +4492,7 @@
         </p:nvSpPr>
         <p:spPr>
           <a:xfrm>
-            <a:off x="4618128" y="2558040"/>
+            <a:off x="3708037" y="1614658"/>
             <a:ext cx="1093635" cy="346760"/>
           </a:xfrm>
           <a:prstGeom prst="rect">
@@ -4562,7 +4578,7 @@
         </p:nvSpPr>
         <p:spPr>
           <a:xfrm>
-            <a:off x="6019800" y="3160410"/>
+            <a:off x="5109709" y="2217028"/>
             <a:ext cx="1200707" cy="346760"/>
           </a:xfrm>
           <a:prstGeom prst="rect">
@@ -4639,19 +4655,131 @@
           </a:p>
         </p:txBody>
       </p:sp>
+      <p:sp>
+        <p:nvSpPr>
+          <p:cNvPr id="73" name="Rectangle 8"/>
+          <p:cNvSpPr/>
+          <p:nvPr/>
+        </p:nvSpPr>
+        <p:spPr>
+          <a:xfrm>
+            <a:off x="6645329" y="1534274"/>
+            <a:ext cx="1259718" cy="346760"/>
+          </a:xfrm>
+          <a:prstGeom prst="rect">
+            <a:avLst/>
+          </a:prstGeom>
+          <a:ln w="19050"/>
+          <a:effectLst/>
+        </p:spPr>
+        <p:style>
+          <a:lnRef idx="1">
+            <a:schemeClr val="accent6"/>
+          </a:lnRef>
+          <a:fillRef idx="2">
+            <a:schemeClr val="accent6"/>
+          </a:fillRef>
+          <a:effectRef idx="1">
+            <a:schemeClr val="accent6"/>
+          </a:effectRef>
+          <a:fontRef idx="minor">
+            <a:schemeClr val="dk1"/>
+          </a:fontRef>
+        </p:style>
+        <p:txBody>
+          <a:bodyPr rtlCol="0" anchor="ctr"/>
+          <a:lstStyle/>
+          <a:p>
+            <a:pPr algn="ctr"/>
+            <a:r>
+              <a:rPr lang="en-US" sz="1050" b="1" dirty="0" err="1" smtClean="0">
+                <a:solidFill>
+                  <a:schemeClr val="accent6">
+                    <a:lumMod val="75000"/>
+                  </a:schemeClr>
+                </a:solidFill>
+              </a:rPr>
+              <a:t>XmlAdaptedEmail</a:t>
+            </a:r>
+            <a:endParaRPr lang="en-SG" sz="1050" b="1" dirty="0">
+              <a:solidFill>
+                <a:schemeClr val="accent6">
+                  <a:lumMod val="75000"/>
+                </a:schemeClr>
+              </a:solidFill>
+            </a:endParaRPr>
+          </a:p>
+        </p:txBody>
+      </p:sp>
+      <p:sp>
+        <p:nvSpPr>
+          <p:cNvPr id="74" name="Rectangle 8"/>
+          <p:cNvSpPr/>
+          <p:nvPr/>
+        </p:nvSpPr>
+        <p:spPr>
+          <a:xfrm>
+            <a:off x="6705647" y="2216242"/>
+            <a:ext cx="1259718" cy="346760"/>
+          </a:xfrm>
+          <a:prstGeom prst="rect">
+            <a:avLst/>
+          </a:prstGeom>
+          <a:ln w="19050"/>
+          <a:effectLst/>
+        </p:spPr>
+        <p:style>
+          <a:lnRef idx="1">
+            <a:schemeClr val="accent6"/>
+          </a:lnRef>
+          <a:fillRef idx="2">
+            <a:schemeClr val="accent6"/>
+          </a:fillRef>
+          <a:effectRef idx="1">
+            <a:schemeClr val="accent6"/>
+          </a:effectRef>
+          <a:fontRef idx="minor">
+            <a:schemeClr val="dk1"/>
+          </a:fontRef>
+        </p:style>
+        <p:txBody>
+          <a:bodyPr rtlCol="0" anchor="ctr"/>
+          <a:lstStyle/>
+          <a:p>
+            <a:pPr algn="ctr"/>
+            <a:r>
+              <a:rPr lang="en-US" sz="1050" b="1" dirty="0" err="1" smtClean="0">
+                <a:solidFill>
+                  <a:schemeClr val="accent6">
+                    <a:lumMod val="75000"/>
+                  </a:schemeClr>
+                </a:solidFill>
+              </a:rPr>
+              <a:t>XmlAdaptedPerson</a:t>
+            </a:r>
+            <a:endParaRPr lang="en-SG" sz="1050" b="1" dirty="0">
+              <a:solidFill>
+                <a:schemeClr val="accent6">
+                  <a:lumMod val="75000"/>
+                </a:schemeClr>
+              </a:solidFill>
+            </a:endParaRPr>
+          </a:p>
+        </p:txBody>
+      </p:sp>
       <p:cxnSp>
         <p:nvCxnSpPr>
-          <p:cNvPr id="70" name="Elbow Connector 122"/>
+          <p:cNvPr id="77" name="Elbow Connector 122"/>
           <p:cNvCxnSpPr>
-            <a:stCxn id="74" idx="0"/>
-            <a:endCxn id="73" idx="2"/>
+            <a:stCxn id="66" idx="3"/>
+            <a:endCxn id="74" idx="1"/>
           </p:cNvCxnSpPr>
           <p:nvPr/>
         </p:nvCxnSpPr>
         <p:spPr>
-          <a:xfrm rot="5400000" flipH="1" flipV="1">
-            <a:off x="8077993" y="2992020"/>
-            <a:ext cx="335208" cy="12700"/>
+          <a:xfrm flipV="1">
+            <a:off x="6310416" y="2389622"/>
+            <a:ext cx="395231" cy="786"/>
           </a:xfrm>
           <a:prstGeom prst="bentConnector3">
             <a:avLst>
@@ -4680,15 +4808,55 @@
           </a:fontRef>
         </p:style>
       </p:cxnSp>
-      <p:sp>
-        <p:nvSpPr>
-          <p:cNvPr id="73" name="Rectangle 8"/>
+      <p:cxnSp>
+        <p:nvCxnSpPr>
+          <p:cNvPr id="5" name="Straight Arrow Connector 4"/>
+          <p:cNvCxnSpPr>
+            <a:stCxn id="74" idx="0"/>
+          </p:cNvCxnSpPr>
+          <p:nvPr/>
+        </p:nvCxnSpPr>
+        <p:spPr>
+          <a:xfrm flipH="1" flipV="1">
+            <a:off x="7296374" y="1869444"/>
+            <a:ext cx="0" cy="360000"/>
+          </a:xfrm>
+          <a:prstGeom prst="straightConnector1">
+            <a:avLst/>
+          </a:prstGeom>
+          <a:ln w="19050">
+            <a:solidFill>
+              <a:schemeClr val="accent6"/>
+            </a:solidFill>
+            <a:prstDash val="sysDot"/>
+            <a:headEnd w="med" len="med"/>
+            <a:tailEnd type="arrow"/>
+          </a:ln>
+        </p:spPr>
+        <p:style>
+          <a:lnRef idx="1">
+            <a:schemeClr val="accent1"/>
+          </a:lnRef>
+          <a:fillRef idx="0">
+            <a:schemeClr val="accent1"/>
+          </a:fillRef>
+          <a:effectRef idx="0">
+            <a:schemeClr val="accent1"/>
+          </a:effectRef>
+          <a:fontRef idx="minor">
+            <a:schemeClr val="tx1"/>
+          </a:fontRef>
+        </p:style>
+      </p:cxnSp>
+      <p:sp>
+        <p:nvSpPr>
+          <p:cNvPr id="29" name="Rectangle 8"/>
           <p:cNvSpPr/>
           <p:nvPr/>
         </p:nvSpPr>
         <p:spPr>
           <a:xfrm>
-            <a:off x="7615738" y="2477656"/>
+            <a:off x="6705647" y="2812340"/>
             <a:ext cx="1259718" cy="346760"/>
           </a:xfrm>
           <a:prstGeom prst="rect">
@@ -4724,7 +4892,7 @@
                   </a:schemeClr>
                 </a:solidFill>
               </a:rPr>
-              <a:t>XmlAdaptedTag</a:t>
+              <a:t>XmlAdaptedTask</a:t>
             </a:r>
             <a:endParaRPr lang="en-SG" sz="1050" b="1" dirty="0">
               <a:solidFill>
@@ -4736,16 +4904,89 @@
           </a:p>
         </p:txBody>
       </p:sp>
-      <p:sp>
-        <p:nvSpPr>
-          <p:cNvPr id="74" name="Rectangle 8"/>
+      <p:cxnSp>
+        <p:nvCxnSpPr>
+          <p:cNvPr id="7" name="Straight Connector 6"/>
+          <p:cNvCxnSpPr/>
+          <p:nvPr/>
+        </p:nvCxnSpPr>
+        <p:spPr>
+          <a:xfrm>
+            <a:off x="6501974" y="2419200"/>
+            <a:ext cx="0" cy="525600"/>
+          </a:xfrm>
+          <a:prstGeom prst="line">
+            <a:avLst/>
+          </a:prstGeom>
+          <a:ln w="19050">
+            <a:solidFill>
+              <a:schemeClr val="accent6"/>
+            </a:solidFill>
+            <a:prstDash val="sysDot"/>
+          </a:ln>
+        </p:spPr>
+        <p:style>
+          <a:lnRef idx="1">
+            <a:schemeClr val="accent1"/>
+          </a:lnRef>
+          <a:fillRef idx="0">
+            <a:schemeClr val="accent1"/>
+          </a:fillRef>
+          <a:effectRef idx="0">
+            <a:schemeClr val="accent1"/>
+          </a:effectRef>
+          <a:fontRef idx="minor">
+            <a:schemeClr val="tx1"/>
+          </a:fontRef>
+        </p:style>
+      </p:cxnSp>
+      <p:cxnSp>
+        <p:nvCxnSpPr>
+          <p:cNvPr id="10" name="Straight Arrow Connector 9"/>
+          <p:cNvCxnSpPr/>
+          <p:nvPr/>
+        </p:nvCxnSpPr>
+        <p:spPr>
+          <a:xfrm>
+            <a:off x="6501974" y="2976840"/>
+            <a:ext cx="203673" cy="0"/>
+          </a:xfrm>
+          <a:prstGeom prst="straightConnector1">
+            <a:avLst/>
+          </a:prstGeom>
+          <a:ln w="19050">
+            <a:solidFill>
+              <a:schemeClr val="accent6"/>
+            </a:solidFill>
+            <a:prstDash val="sysDot"/>
+            <a:tailEnd type="arrow"/>
+          </a:ln>
+        </p:spPr>
+        <p:style>
+          <a:lnRef idx="1">
+            <a:schemeClr val="accent1"/>
+          </a:lnRef>
+          <a:fillRef idx="0">
+            <a:schemeClr val="accent1"/>
+          </a:fillRef>
+          <a:effectRef idx="0">
+            <a:schemeClr val="accent1"/>
+          </a:effectRef>
+          <a:fontRef idx="minor">
+            <a:schemeClr val="tx1"/>
+          </a:fontRef>
+        </p:style>
+      </p:cxnSp>
+      <p:sp>
+        <p:nvSpPr>
+          <p:cNvPr id="36" name="Rectangle 8"/>
           <p:cNvSpPr/>
           <p:nvPr/>
         </p:nvSpPr>
         <p:spPr>
           <a:xfrm>
-            <a:off x="7615738" y="3159624"/>
-            <a:ext cx="1259718" cy="346760"/>
+            <a:off x="5222807" y="1534274"/>
+            <a:ext cx="1365101" cy="346760"/>
           </a:xfrm>
           <a:prstGeom prst="rect">
             <a:avLst/>
@@ -4780,7 +5021,7 @@
                   </a:schemeClr>
                 </a:solidFill>
               </a:rPr>
-              <a:t>XmlAdaptedPerson</a:t>
+              <a:t>XmlAdaptedPhone</a:t>
             </a:r>
             <a:endParaRPr lang="en-SG" sz="1050" b="1" dirty="0">
               <a:solidFill>
@@ -4792,30 +5033,21 @@
           </a:p>
         </p:txBody>
       </p:sp>
-      <p:cxnSp>
-        <p:nvCxnSpPr>
-          <p:cNvPr id="77" name="Elbow Connector 122"/>
-          <p:cNvCxnSpPr>
-            <a:stCxn id="66" idx="3"/>
-            <a:endCxn id="74" idx="1"/>
-          </p:cNvCxnSpPr>
+      <p:sp>
+        <p:nvSpPr>
+          <p:cNvPr id="37" name="Rectangle 8"/>
+          <p:cNvSpPr/>
           <p:nvPr/>
-        </p:nvCxnSpPr>
-        <p:spPr>
-          <a:xfrm flipV="1">
-            <a:off x="7220507" y="3333004"/>
-            <a:ext cx="395231" cy="786"/>
-          </a:xfrm>
-          <a:prstGeom prst="bentConnector3">
-            <a:avLst>
-              <a:gd name="adj1" fmla="val 50000"/>
-            </a:avLst>
+        </p:nvSpPr>
+        <p:spPr>
+          <a:xfrm>
+            <a:off x="7954211" y="1534274"/>
+            <a:ext cx="1375862" cy="346760"/>
+          </a:xfrm>
+          <a:prstGeom prst="rect">
+            <a:avLst/>
           </a:prstGeom>
-          <a:ln w="19050">
-            <a:prstDash val="sysDot"/>
-            <a:headEnd type="none" w="med" len="med"/>
-            <a:tailEnd type="arrow" w="med" len="med"/>
-          </a:ln>
+          <a:ln w="19050"/>
           <a:effectLst/>
         </p:spPr>
         <p:style>
@@ -4830,6 +5062,140 @@
           </a:effectRef>
           <a:fontRef idx="minor">
             <a:schemeClr val="dk1"/>
+          </a:fontRef>
+        </p:style>
+        <p:txBody>
+          <a:bodyPr rtlCol="0" anchor="ctr"/>
+          <a:lstStyle/>
+          <a:p>
+            <a:pPr algn="ctr"/>
+            <a:r>
+              <a:rPr lang="en-US" sz="1050" b="1" dirty="0" err="1" smtClean="0">
+                <a:solidFill>
+                  <a:schemeClr val="accent6">
+                    <a:lumMod val="75000"/>
+                  </a:schemeClr>
+                </a:solidFill>
+              </a:rPr>
+              <a:t>XmlAdaptedModule</a:t>
+            </a:r>
+            <a:endParaRPr lang="en-SG" sz="1050" b="1" dirty="0">
+              <a:solidFill>
+                <a:schemeClr val="accent6">
+                  <a:lumMod val="75000"/>
+                </a:schemeClr>
+              </a:solidFill>
+            </a:endParaRPr>
+          </a:p>
+        </p:txBody>
+      </p:sp>
+      <p:cxnSp>
+        <p:nvCxnSpPr>
+          <p:cNvPr id="38" name="Straight Connector 37"/>
+          <p:cNvCxnSpPr/>
+          <p:nvPr/>
+        </p:nvCxnSpPr>
+        <p:spPr>
+          <a:xfrm>
+            <a:off x="5846145" y="2106397"/>
+            <a:ext cx="2790000" cy="0"/>
+          </a:xfrm>
+          <a:prstGeom prst="line">
+            <a:avLst/>
+          </a:prstGeom>
+          <a:ln w="19050">
+            <a:solidFill>
+              <a:schemeClr val="accent6"/>
+            </a:solidFill>
+            <a:prstDash val="sysDot"/>
+          </a:ln>
+        </p:spPr>
+        <p:style>
+          <a:lnRef idx="1">
+            <a:schemeClr val="accent1"/>
+          </a:lnRef>
+          <a:fillRef idx="0">
+            <a:schemeClr val="accent1"/>
+          </a:fillRef>
+          <a:effectRef idx="0">
+            <a:schemeClr val="accent1"/>
+          </a:effectRef>
+          <a:fontRef idx="minor">
+            <a:schemeClr val="tx1"/>
+          </a:fontRef>
+        </p:style>
+      </p:cxnSp>
+      <p:cxnSp>
+        <p:nvCxnSpPr>
+          <p:cNvPr id="43" name="Straight Arrow Connector 42"/>
+          <p:cNvCxnSpPr/>
+          <p:nvPr/>
+        </p:nvCxnSpPr>
+        <p:spPr>
+          <a:xfrm flipV="1">
+            <a:off x="5846145" y="1881034"/>
+            <a:ext cx="47" cy="238688"/>
+          </a:xfrm>
+          <a:prstGeom prst="straightConnector1">
+            <a:avLst/>
+          </a:prstGeom>
+          <a:ln w="19050">
+            <a:solidFill>
+              <a:schemeClr val="accent6"/>
+            </a:solidFill>
+            <a:prstDash val="sysDot"/>
+            <a:tailEnd type="arrow"/>
+          </a:ln>
+        </p:spPr>
+        <p:style>
+          <a:lnRef idx="1">
+            <a:schemeClr val="accent1"/>
+          </a:lnRef>
+          <a:fillRef idx="0">
+            <a:schemeClr val="accent1"/>
+          </a:fillRef>
+          <a:effectRef idx="0">
+            <a:schemeClr val="accent1"/>
+          </a:effectRef>
+          <a:fontRef idx="minor">
+            <a:schemeClr val="tx1"/>
+          </a:fontRef>
+        </p:style>
+      </p:cxnSp>
+      <p:cxnSp>
+        <p:nvCxnSpPr>
+          <p:cNvPr id="48" name="Straight Arrow Connector 47"/>
+          <p:cNvCxnSpPr/>
+          <p:nvPr/>
+        </p:nvCxnSpPr>
+        <p:spPr>
+          <a:xfrm flipV="1">
+            <a:off x="8629079" y="1881034"/>
+            <a:ext cx="47" cy="238688"/>
+          </a:xfrm>
+          <a:prstGeom prst="straightConnector1">
+            <a:avLst/>
+          </a:prstGeom>
+          <a:ln w="19050">
+            <a:solidFill>
+              <a:schemeClr val="accent6"/>
+            </a:solidFill>
+            <a:prstDash val="sysDot"/>
+            <a:tailEnd type="arrow"/>
+          </a:ln>
+        </p:spPr>
+        <p:style>
+          <a:lnRef idx="1">
+            <a:schemeClr val="accent1"/>
+          </a:lnRef>
+          <a:fillRef idx="0">
+            <a:schemeClr val="accent1"/>
+          </a:fillRef>
+          <a:effectRef idx="0">
+            <a:schemeClr val="accent1"/>
+          </a:effectRef>
+          <a:fontRef idx="minor">
+            <a:schemeClr val="tx1"/>
           </a:fontRef>
         </p:style>
       </p:cxnSp>

</xml_diff>